<commit_message>
Add slides on haystack architecture
</commit_message>
<xml_diff>
--- a/presentation/presentation.pptx
+++ b/presentation/presentation.pptx
@@ -7,7 +7,7 @@
     <p:sldMasterId id="2147483656" r:id="rId3"/>
   </p:sldMasterIdLst>
   <p:notesMasterIdLst>
-    <p:notesMasterId r:id="rId12"/>
+    <p:notesMasterId r:id="rId14"/>
   </p:notesMasterIdLst>
   <p:sldIdLst>
     <p:sldId id="256" r:id="rId4"/>
@@ -18,6 +18,8 @@
     <p:sldId id="261" r:id="rId9"/>
     <p:sldId id="262" r:id="rId10"/>
     <p:sldId id="263" r:id="rId11"/>
+    <p:sldId id="264" r:id="rId12"/>
+    <p:sldId id="265" r:id="rId13"/>
   </p:sldIdLst>
   <p:sldSz cx="9144000" cy="6858000" type="screen4x3"/>
   <p:notesSz cx="6858000" cy="9144000"/>
@@ -321,7 +323,7 @@
         <p:nvSpPr>
           <p:cNvPr id="8196" name="Rectangle 4"/>
           <p:cNvSpPr>
-            <a:spLocks noRot="1" noChangeArrowheads="1" noTextEdit="1"/>
+            <a:spLocks noGrp="1" noRot="1" noChangeAspect="1" noChangeArrowheads="1" noTextEdit="1"/>
           </p:cNvSpPr>
           <p:nvPr>
             <p:ph type="sldImg" idx="2"/>
@@ -836,6 +838,258 @@
 </p:notes>
 </file>
 
+<file path=ppt/notesSlides/notesSlide2.xml><?xml version="1.0" encoding="utf-8"?>
+<p:notes xmlns:a="http://schemas.openxmlformats.org/drawingml/2006/main" xmlns:r="http://schemas.openxmlformats.org/officeDocument/2006/relationships" xmlns:p="http://schemas.openxmlformats.org/presentationml/2006/main">
+  <p:cSld>
+    <p:spTree>
+      <p:nvGrpSpPr>
+        <p:cNvPr id="1" name=""/>
+        <p:cNvGrpSpPr/>
+        <p:nvPr/>
+      </p:nvGrpSpPr>
+      <p:grpSpPr>
+        <a:xfrm>
+          <a:off x="0" y="0"/>
+          <a:ext cx="0" cy="0"/>
+          <a:chOff x="0" y="0"/>
+          <a:chExt cx="0" cy="0"/>
+        </a:xfrm>
+      </p:grpSpPr>
+      <p:sp>
+        <p:nvSpPr>
+          <p:cNvPr id="2" name="Slide Image Placeholder 1"/>
+          <p:cNvSpPr>
+            <a:spLocks noGrp="1" noRot="1" noChangeAspect="1"/>
+          </p:cNvSpPr>
+          <p:nvPr>
+            <p:ph type="sldImg"/>
+          </p:nvPr>
+        </p:nvSpPr>
+        <p:spPr/>
+      </p:sp>
+      <p:sp>
+        <p:nvSpPr>
+          <p:cNvPr id="3" name="Notes Placeholder 2"/>
+          <p:cNvSpPr>
+            <a:spLocks noGrp="1"/>
+          </p:cNvSpPr>
+          <p:nvPr>
+            <p:ph type="body" idx="1"/>
+          </p:nvPr>
+        </p:nvSpPr>
+        <p:spPr/>
+        <p:txBody>
+          <a:bodyPr/>
+          <a:lstStyle/>
+          <a:p>
+            <a:pPr marL="171450" indent="-171450">
+              <a:buFont typeface="Arial" charset="0"/>
+              <a:buChar char="•"/>
+            </a:pPr>
+            <a:r>
+              <a:rPr lang="nl-NL" dirty="0" smtClean="0"/>
+              <a:t>Mapping from logical</a:t>
+            </a:r>
+            <a:r>
+              <a:rPr lang="nl-NL" baseline="0" dirty="0" smtClean="0"/>
+              <a:t> volumes to physical volumes</a:t>
+            </a:r>
+          </a:p>
+          <a:p>
+            <a:pPr marL="171450" indent="-171450">
+              <a:buFont typeface="Arial" charset="0"/>
+              <a:buChar char="•"/>
+            </a:pPr>
+            <a:r>
+              <a:rPr lang="nl-NL" baseline="0" dirty="0" smtClean="0"/>
+              <a:t>Balances writes across logical volumes and reads across physical volumes</a:t>
+            </a:r>
+          </a:p>
+          <a:p>
+            <a:pPr marL="171450" indent="-171450">
+              <a:buFont typeface="Arial" charset="0"/>
+              <a:buChar char="•"/>
+            </a:pPr>
+            <a:r>
+              <a:rPr lang="nl-NL" baseline="0" dirty="0" smtClean="0"/>
+              <a:t>Determines wheter the request should be handled by a CDN or by the cache</a:t>
+            </a:r>
+          </a:p>
+          <a:p>
+            <a:pPr marL="171450" indent="-171450">
+              <a:buFont typeface="Arial" charset="0"/>
+              <a:buChar char="•"/>
+            </a:pPr>
+            <a:r>
+              <a:rPr lang="nl-NL" baseline="0" dirty="0" smtClean="0"/>
+              <a:t>Read only logical volumes for some reason</a:t>
+            </a:r>
+          </a:p>
+          <a:p>
+            <a:pPr marL="171450" indent="-171450">
+              <a:buFont typeface="Arial" charset="0"/>
+              <a:buChar char="•"/>
+            </a:pPr>
+            <a:endParaRPr lang="nl-NL" dirty="0"/>
+          </a:p>
+        </p:txBody>
+      </p:sp>
+      <p:sp>
+        <p:nvSpPr>
+          <p:cNvPr id="4" name="Slide Number Placeholder 3"/>
+          <p:cNvSpPr>
+            <a:spLocks noGrp="1"/>
+          </p:cNvSpPr>
+          <p:nvPr>
+            <p:ph type="sldNum" sz="quarter" idx="10"/>
+          </p:nvPr>
+        </p:nvSpPr>
+        <p:spPr/>
+        <p:txBody>
+          <a:bodyPr/>
+          <a:lstStyle/>
+          <a:p>
+            <a:fld id="{8106FA6E-CA28-4ADD-97EA-D8B210CE5A1D}" type="slidenum">
+              <a:rPr lang="nl-NL" smtClean="0"/>
+              <a:pPr/>
+              <a:t>7</a:t>
+            </a:fld>
+            <a:endParaRPr lang="nl-NL"/>
+          </a:p>
+        </p:txBody>
+      </p:sp>
+    </p:spTree>
+    <p:extLst>
+      <p:ext uri="{BB962C8B-B14F-4D97-AF65-F5344CB8AC3E}">
+        <p14:creationId xmlns:p14="http://schemas.microsoft.com/office/powerpoint/2010/main" val="2618116611"/>
+      </p:ext>
+    </p:extLst>
+  </p:cSld>
+  <p:clrMapOvr>
+    <a:masterClrMapping/>
+  </p:clrMapOvr>
+</p:notes>
+</file>
+
+<file path=ppt/notesSlides/notesSlide3.xml><?xml version="1.0" encoding="utf-8"?>
+<p:notes xmlns:a="http://schemas.openxmlformats.org/drawingml/2006/main" xmlns:r="http://schemas.openxmlformats.org/officeDocument/2006/relationships" xmlns:p="http://schemas.openxmlformats.org/presentationml/2006/main">
+  <p:cSld>
+    <p:spTree>
+      <p:nvGrpSpPr>
+        <p:cNvPr id="1" name=""/>
+        <p:cNvGrpSpPr/>
+        <p:nvPr/>
+      </p:nvGrpSpPr>
+      <p:grpSpPr>
+        <a:xfrm>
+          <a:off x="0" y="0"/>
+          <a:ext cx="0" cy="0"/>
+          <a:chOff x="0" y="0"/>
+          <a:chExt cx="0" cy="0"/>
+        </a:xfrm>
+      </p:grpSpPr>
+      <p:sp>
+        <p:nvSpPr>
+          <p:cNvPr id="2" name="Slide Image Placeholder 1"/>
+          <p:cNvSpPr>
+            <a:spLocks noGrp="1" noRot="1" noChangeAspect="1"/>
+          </p:cNvSpPr>
+          <p:nvPr>
+            <p:ph type="sldImg"/>
+          </p:nvPr>
+        </p:nvSpPr>
+        <p:spPr/>
+      </p:sp>
+      <p:sp>
+        <p:nvSpPr>
+          <p:cNvPr id="3" name="Notes Placeholder 2"/>
+          <p:cNvSpPr>
+            <a:spLocks noGrp="1"/>
+          </p:cNvSpPr>
+          <p:nvPr>
+            <p:ph type="body" idx="1"/>
+          </p:nvPr>
+        </p:nvSpPr>
+        <p:spPr/>
+        <p:txBody>
+          <a:bodyPr/>
+          <a:lstStyle/>
+          <a:p>
+            <a:r>
+              <a:rPr lang="nl-NL" dirty="0" smtClean="0"/>
+              <a:t>The caching rules are important here:</a:t>
+            </a:r>
+          </a:p>
+          <a:p>
+            <a:r>
+              <a:rPr lang="nl-NL" dirty="0" smtClean="0"/>
+              <a:t>If</a:t>
+            </a:r>
+            <a:r>
+              <a:rPr lang="nl-NL" baseline="0" dirty="0" smtClean="0"/>
+              <a:t> a request misses in the CDN, why would it be in the cache?</a:t>
+            </a:r>
+          </a:p>
+          <a:p>
+            <a:r>
+              <a:rPr lang="nl-NL" baseline="0" dirty="0" smtClean="0"/>
+              <a:t>Therefore, don’t cache requests from the CDN.</a:t>
+            </a:r>
+          </a:p>
+          <a:p>
+            <a:endParaRPr lang="nl-NL" baseline="0" dirty="0" smtClean="0"/>
+          </a:p>
+          <a:p>
+            <a:r>
+              <a:rPr lang="nl-NL" baseline="0" dirty="0" smtClean="0"/>
+              <a:t>Photos are most heavily accessed soon after upload, filesystems work better when doing either reads or writes but not both.</a:t>
+            </a:r>
+          </a:p>
+          <a:p>
+            <a:r>
+              <a:rPr lang="nl-NL" baseline="0" dirty="0" smtClean="0"/>
+              <a:t>Thus write-enabled store machines would see the most reads if it were not for the cache.</a:t>
+            </a:r>
+          </a:p>
+        </p:txBody>
+      </p:sp>
+      <p:sp>
+        <p:nvSpPr>
+          <p:cNvPr id="4" name="Slide Number Placeholder 3"/>
+          <p:cNvSpPr>
+            <a:spLocks noGrp="1"/>
+          </p:cNvSpPr>
+          <p:nvPr>
+            <p:ph type="sldNum" sz="quarter" idx="10"/>
+          </p:nvPr>
+        </p:nvSpPr>
+        <p:spPr/>
+        <p:txBody>
+          <a:bodyPr/>
+          <a:lstStyle/>
+          <a:p>
+            <a:fld id="{8106FA6E-CA28-4ADD-97EA-D8B210CE5A1D}" type="slidenum">
+              <a:rPr lang="nl-NL" smtClean="0"/>
+              <a:pPr/>
+              <a:t>8</a:t>
+            </a:fld>
+            <a:endParaRPr lang="nl-NL"/>
+          </a:p>
+        </p:txBody>
+      </p:sp>
+    </p:spTree>
+    <p:extLst>
+      <p:ext uri="{BB962C8B-B14F-4D97-AF65-F5344CB8AC3E}">
+        <p14:creationId xmlns:p14="http://schemas.microsoft.com/office/powerpoint/2010/main" val="1290113878"/>
+      </p:ext>
+    </p:extLst>
+  </p:cSld>
+  <p:clrMapOvr>
+    <a:masterClrMapping/>
+  </p:clrMapOvr>
+</p:notes>
+</file>
+
 <file path=ppt/slideLayouts/slideLayout1.xml><?xml version="1.0" encoding="utf-8"?>
 <p:sldLayout xmlns:a="http://schemas.openxmlformats.org/drawingml/2006/main" xmlns:r="http://schemas.openxmlformats.org/officeDocument/2006/relationships" xmlns:p="http://schemas.openxmlformats.org/presentationml/2006/main" showMasterSp="0" type="title" preserve="1">
   <p:cSld name="Title Slide">
@@ -1117,7 +1371,7 @@
           <a:p>
             <a:fld id="{1FA17AF5-FBB5-4916-8910-0F5324AF15F2}" type="datetime1">
               <a:rPr lang="nl-NL" smtClean="0"/>
-              <a:t>21-9-2014</a:t>
+              <a:t>24-9-2014</a:t>
             </a:fld>
             <a:endParaRPr lang="nl-NL"/>
           </a:p>
@@ -1318,7 +1572,7 @@
           <a:p>
             <a:fld id="{CCA5352A-0CC6-4438-BD9F-8704C8925C42}" type="datetime1">
               <a:rPr lang="nl-NL" smtClean="0"/>
-              <a:t>21-9-2014</a:t>
+              <a:t>24-9-2014</a:t>
             </a:fld>
             <a:endParaRPr lang="nl-NL"/>
           </a:p>
@@ -1686,7 +1940,7 @@
           <a:p>
             <a:fld id="{EB233FDD-2AC2-4E17-B268-9C194B3D7FE7}" type="datetime1">
               <a:rPr lang="nl-NL" smtClean="0"/>
-              <a:t>21-9-2014</a:t>
+              <a:t>24-9-2014</a:t>
             </a:fld>
             <a:endParaRPr lang="nl-NL"/>
           </a:p>
@@ -1899,7 +2153,7 @@
           <a:p>
             <a:fld id="{B7A7F543-CD81-4195-A8EA-FAAEB8BF2ACF}" type="datetime1">
               <a:rPr lang="nl-NL" smtClean="0"/>
-              <a:t>21-9-2014</a:t>
+              <a:t>24-9-2014</a:t>
             </a:fld>
             <a:endParaRPr lang="nl-NL"/>
           </a:p>
@@ -2208,7 +2462,7 @@
           <a:p>
             <a:fld id="{881C6A17-9D20-411C-BF2A-6DE941E6C5A0}" type="datetime1">
               <a:rPr lang="nl-NL" smtClean="0"/>
-              <a:t>21-9-2014</a:t>
+              <a:t>24-9-2014</a:t>
             </a:fld>
             <a:endParaRPr lang="nl-NL"/>
           </a:p>
@@ -2656,7 +2910,7 @@
           <a:p>
             <a:fld id="{78C69642-B6AA-4ED7-8D60-DB675A092ABD}" type="datetime1">
               <a:rPr lang="nl-NL" smtClean="0"/>
-              <a:t>21-9-2014</a:t>
+              <a:t>24-9-2014</a:t>
             </a:fld>
             <a:endParaRPr lang="nl-NL"/>
           </a:p>
@@ -2795,7 +3049,7 @@
           <a:p>
             <a:fld id="{2F548E62-B384-4D17-A8E3-B4EC20800DEE}" type="datetime1">
               <a:rPr lang="nl-NL" smtClean="0"/>
-              <a:t>21-9-2014</a:t>
+              <a:t>24-9-2014</a:t>
             </a:fld>
             <a:endParaRPr lang="nl-NL"/>
           </a:p>
@@ -2911,7 +3165,7 @@
           <a:p>
             <a:fld id="{1D65376C-5DFC-49F4-8DFB-E1F46C832719}" type="datetime1">
               <a:rPr lang="nl-NL" smtClean="0"/>
-              <a:t>21-9-2014</a:t>
+              <a:t>24-9-2014</a:t>
             </a:fld>
             <a:endParaRPr lang="nl-NL"/>
           </a:p>
@@ -3209,7 +3463,7 @@
           <a:p>
             <a:fld id="{13B4B9A4-F0E6-47E7-8CF1-BD6DE7407917}" type="datetime1">
               <a:rPr lang="nl-NL" smtClean="0"/>
-              <a:t>21-9-2014</a:t>
+              <a:t>24-9-2014</a:t>
             </a:fld>
             <a:endParaRPr lang="nl-NL"/>
           </a:p>
@@ -3400,7 +3654,7 @@
           <a:p>
             <a:fld id="{294FE659-C695-4330-B737-C882170B1366}" type="datetime1">
               <a:rPr lang="nl-NL" smtClean="0"/>
-              <a:t>21-9-2014</a:t>
+              <a:t>24-9-2014</a:t>
             </a:fld>
             <a:endParaRPr lang="nl-NL"/>
           </a:p>
@@ -3674,7 +3928,7 @@
           <a:p>
             <a:fld id="{F75B3122-9457-4CF7-8F75-8AA0C4D0E80D}" type="datetime1">
               <a:rPr lang="nl-NL" smtClean="0"/>
-              <a:t>21-9-2014</a:t>
+              <a:t>24-9-2014</a:t>
             </a:fld>
             <a:endParaRPr lang="nl-NL"/>
           </a:p>
@@ -3865,7 +4119,7 @@
           <a:p>
             <a:fld id="{FDBDA0CD-BD68-47B1-AEFF-2A74DBD9F203}" type="datetime1">
               <a:rPr lang="nl-NL" smtClean="0"/>
-              <a:t>21-9-2014</a:t>
+              <a:t>24-9-2014</a:t>
             </a:fld>
             <a:endParaRPr lang="nl-NL"/>
           </a:p>
@@ -4066,7 +4320,7 @@
           <a:p>
             <a:fld id="{34581CC6-2DEA-411C-BF5C-82FAAD850880}" type="datetime1">
               <a:rPr lang="nl-NL" smtClean="0"/>
-              <a:t>21-9-2014</a:t>
+              <a:t>24-9-2014</a:t>
             </a:fld>
             <a:endParaRPr lang="nl-NL"/>
           </a:p>
@@ -4364,7 +4618,7 @@
           <a:p>
             <a:fld id="{E52B3786-FC07-41A1-89C4-63E8CC105088}" type="datetime1">
               <a:rPr lang="nl-NL" smtClean="0"/>
-              <a:t>21-9-2014</a:t>
+              <a:t>24-9-2014</a:t>
             </a:fld>
             <a:endParaRPr lang="nl-NL"/>
           </a:p>
@@ -4577,7 +4831,7 @@
           <a:p>
             <a:fld id="{417AD321-A2E5-44EA-A77D-689667D84A3D}" type="datetime1">
               <a:rPr lang="nl-NL" smtClean="0"/>
-              <a:t>21-9-2014</a:t>
+              <a:t>24-9-2014</a:t>
             </a:fld>
             <a:endParaRPr lang="nl-NL"/>
           </a:p>
@@ -4886,7 +5140,7 @@
           <a:p>
             <a:fld id="{1CF528E7-C3DB-478C-9E53-66EE4E44624B}" type="datetime1">
               <a:rPr lang="nl-NL" smtClean="0"/>
-              <a:t>21-9-2014</a:t>
+              <a:t>24-9-2014</a:t>
             </a:fld>
             <a:endParaRPr lang="nl-NL"/>
           </a:p>
@@ -5334,7 +5588,7 @@
           <a:p>
             <a:fld id="{D1DF25AE-F6BE-4CFA-9353-36F273A72864}" type="datetime1">
               <a:rPr lang="nl-NL" smtClean="0"/>
-              <a:t>21-9-2014</a:t>
+              <a:t>24-9-2014</a:t>
             </a:fld>
             <a:endParaRPr lang="nl-NL"/>
           </a:p>
@@ -5473,7 +5727,7 @@
           <a:p>
             <a:fld id="{89A4AB83-6B5D-4630-BE5A-6C53A88B0EA2}" type="datetime1">
               <a:rPr lang="nl-NL" smtClean="0"/>
-              <a:t>21-9-2014</a:t>
+              <a:t>24-9-2014</a:t>
             </a:fld>
             <a:endParaRPr lang="nl-NL"/>
           </a:p>
@@ -5589,7 +5843,7 @@
           <a:p>
             <a:fld id="{5386EC31-8267-4B8E-9F09-043A589D57B0}" type="datetime1">
               <a:rPr lang="nl-NL" smtClean="0"/>
-              <a:t>21-9-2014</a:t>
+              <a:t>24-9-2014</a:t>
             </a:fld>
             <a:endParaRPr lang="nl-NL"/>
           </a:p>
@@ -5802,7 +6056,7 @@
           <a:p>
             <a:fld id="{84B7A284-E8FA-410F-8647-3F020546BF2F}" type="datetime1">
               <a:rPr lang="nl-NL" smtClean="0"/>
-              <a:t>21-9-2014</a:t>
+              <a:t>24-9-2014</a:t>
             </a:fld>
             <a:endParaRPr lang="nl-NL"/>
           </a:p>
@@ -6100,7 +6354,7 @@
           <a:p>
             <a:fld id="{143011F3-9191-4AE9-990E-5106A0D38BAA}" type="datetime1">
               <a:rPr lang="nl-NL" smtClean="0"/>
-              <a:t>21-9-2014</a:t>
+              <a:t>24-9-2014</a:t>
             </a:fld>
             <a:endParaRPr lang="nl-NL"/>
           </a:p>
@@ -6374,7 +6628,7 @@
           <a:p>
             <a:fld id="{5DC4A893-DA4A-4972-B9DB-504BDFCD152F}" type="datetime1">
               <a:rPr lang="nl-NL" smtClean="0"/>
-              <a:t>21-9-2014</a:t>
+              <a:t>24-9-2014</a:t>
             </a:fld>
             <a:endParaRPr lang="nl-NL"/>
           </a:p>
@@ -6565,7 +6819,7 @@
           <a:p>
             <a:fld id="{81FB8097-25CB-4800-8518-9A96B11CF4CA}" type="datetime1">
               <a:rPr lang="nl-NL" smtClean="0"/>
-              <a:t>21-9-2014</a:t>
+              <a:t>24-9-2014</a:t>
             </a:fld>
             <a:endParaRPr lang="nl-NL"/>
           </a:p>
@@ -6766,7 +7020,7 @@
           <a:p>
             <a:fld id="{D36F1D4B-27ED-4673-A0F3-EB7D4CBBDBAE}" type="datetime1">
               <a:rPr lang="nl-NL" smtClean="0"/>
-              <a:t>21-9-2014</a:t>
+              <a:t>24-9-2014</a:t>
             </a:fld>
             <a:endParaRPr lang="nl-NL"/>
           </a:p>
@@ -7075,7 +7329,7 @@
           <a:p>
             <a:fld id="{92118B19-F915-4362-8044-8D14F740C9C4}" type="datetime1">
               <a:rPr lang="nl-NL" smtClean="0"/>
-              <a:t>21-9-2014</a:t>
+              <a:t>24-9-2014</a:t>
             </a:fld>
             <a:endParaRPr lang="nl-NL"/>
           </a:p>
@@ -7523,7 +7777,7 @@
           <a:p>
             <a:fld id="{81FE54C6-A890-47F1-BFAC-F11C102B5C7A}" type="datetime1">
               <a:rPr lang="nl-NL" smtClean="0"/>
-              <a:t>21-9-2014</a:t>
+              <a:t>24-9-2014</a:t>
             </a:fld>
             <a:endParaRPr lang="nl-NL"/>
           </a:p>
@@ -7662,7 +7916,7 @@
           <a:p>
             <a:fld id="{FE4182E6-C31C-4527-B69D-712019065F4C}" type="datetime1">
               <a:rPr lang="nl-NL" smtClean="0"/>
-              <a:t>21-9-2014</a:t>
+              <a:t>24-9-2014</a:t>
             </a:fld>
             <a:endParaRPr lang="nl-NL"/>
           </a:p>
@@ -7778,7 +8032,7 @@
           <a:p>
             <a:fld id="{136414F8-8B26-47E6-B4FF-C17F389603D6}" type="datetime1">
               <a:rPr lang="nl-NL" smtClean="0"/>
-              <a:t>21-9-2014</a:t>
+              <a:t>24-9-2014</a:t>
             </a:fld>
             <a:endParaRPr lang="nl-NL"/>
           </a:p>
@@ -8076,7 +8330,7 @@
           <a:p>
             <a:fld id="{B834BFC9-1A10-41EB-B79A-AA7A9638BAEB}" type="datetime1">
               <a:rPr lang="nl-NL" smtClean="0"/>
-              <a:t>21-9-2014</a:t>
+              <a:t>24-9-2014</a:t>
             </a:fld>
             <a:endParaRPr lang="nl-NL"/>
           </a:p>
@@ -8354,7 +8608,7 @@
           <a:p>
             <a:fld id="{17292D92-150B-4046-AF94-224E9E2438F2}" type="datetime1">
               <a:rPr lang="nl-NL" smtClean="0"/>
-              <a:t>21-9-2014</a:t>
+              <a:t>24-9-2014</a:t>
             </a:fld>
             <a:endParaRPr lang="nl-NL"/>
           </a:p>
@@ -8813,7 +9067,7 @@
           <a:p>
             <a:fld id="{0ED15440-D4DF-477C-8731-94CD6D3F5877}" type="datetime1">
               <a:rPr lang="nl-NL" smtClean="0"/>
-              <a:t>21-9-2014</a:t>
+              <a:t>24-9-2014</a:t>
             </a:fld>
             <a:endParaRPr lang="nl-NL"/>
           </a:p>
@@ -9775,7 +10029,7 @@
           <a:p>
             <a:fld id="{238076FC-E76B-4057-9795-CFC6D2173E8B}" type="datetime1">
               <a:rPr lang="nl-NL" smtClean="0"/>
-              <a:t>21-9-2014</a:t>
+              <a:t>24-9-2014</a:t>
             </a:fld>
             <a:endParaRPr lang="nl-NL"/>
           </a:p>
@@ -10736,7 +10990,7 @@
           <a:p>
             <a:fld id="{412F90C6-2F83-4F4F-A3F0-58B36B07887E}" type="datetime1">
               <a:rPr lang="nl-NL" smtClean="0"/>
-              <a:t>21-9-2014</a:t>
+              <a:t>24-9-2014</a:t>
             </a:fld>
             <a:endParaRPr lang="nl-NL"/>
           </a:p>
@@ -11359,6 +11613,231 @@
 </p:sld>
 </file>
 
+<file path=ppt/slides/slide10.xml><?xml version="1.0" encoding="utf-8"?>
+<p:sld xmlns:a="http://schemas.openxmlformats.org/drawingml/2006/main" xmlns:r="http://schemas.openxmlformats.org/officeDocument/2006/relationships" xmlns:p="http://schemas.openxmlformats.org/presentationml/2006/main">
+  <p:cSld>
+    <p:spTree>
+      <p:nvGrpSpPr>
+        <p:cNvPr id="1" name=""/>
+        <p:cNvGrpSpPr/>
+        <p:nvPr/>
+      </p:nvGrpSpPr>
+      <p:grpSpPr>
+        <a:xfrm>
+          <a:off x="0" y="0"/>
+          <a:ext cx="0" cy="0"/>
+          <a:chOff x="0" y="0"/>
+          <a:chExt cx="0" cy="0"/>
+        </a:xfrm>
+      </p:grpSpPr>
+      <p:sp>
+        <p:nvSpPr>
+          <p:cNvPr id="2" name="Title 1"/>
+          <p:cNvSpPr>
+            <a:spLocks noGrp="1"/>
+          </p:cNvSpPr>
+          <p:nvPr>
+            <p:ph type="title"/>
+          </p:nvPr>
+        </p:nvSpPr>
+        <p:spPr>
+          <a:xfrm>
+            <a:off x="611188" y="215900"/>
+            <a:ext cx="8024812" cy="590034"/>
+          </a:xfrm>
+        </p:spPr>
+        <p:txBody>
+          <a:bodyPr/>
+          <a:lstStyle/>
+          <a:p>
+            <a:r>
+              <a:rPr lang="nl-NL" dirty="0" smtClean="0"/>
+              <a:t>Haystack architecture</a:t>
+            </a:r>
+            <a:endParaRPr lang="nl-NL" dirty="0"/>
+          </a:p>
+        </p:txBody>
+      </p:sp>
+      <p:sp>
+        <p:nvSpPr>
+          <p:cNvPr id="3" name="Content Placeholder 2"/>
+          <p:cNvSpPr>
+            <a:spLocks noGrp="1"/>
+          </p:cNvSpPr>
+          <p:nvPr>
+            <p:ph idx="1"/>
+          </p:nvPr>
+        </p:nvSpPr>
+        <p:spPr/>
+        <p:txBody>
+          <a:bodyPr/>
+          <a:lstStyle/>
+          <a:p>
+            <a:r>
+              <a:rPr lang="nl-NL" dirty="0" smtClean="0"/>
+              <a:t>Very basic</a:t>
+            </a:r>
+          </a:p>
+          <a:p>
+            <a:r>
+              <a:rPr lang="nl-NL" dirty="0" smtClean="0"/>
+              <a:t>Specific requests asking for photo by id</a:t>
+            </a:r>
+          </a:p>
+          <a:p>
+            <a:r>
+              <a:rPr lang="nl-NL" dirty="0" smtClean="0"/>
+              <a:t>Given logical volume and physical machine</a:t>
+            </a:r>
+          </a:p>
+          <a:p>
+            <a:r>
+              <a:rPr lang="nl-NL" dirty="0" smtClean="0"/>
+              <a:t>Physical volumes are very large files</a:t>
+            </a:r>
+          </a:p>
+          <a:p>
+            <a:r>
+              <a:rPr lang="nl-NL" dirty="0" smtClean="0"/>
+              <a:t>Find photo within file with the information already available</a:t>
+            </a:r>
+          </a:p>
+          <a:p>
+            <a:r>
+              <a:rPr lang="nl-NL" dirty="0" smtClean="0"/>
+              <a:t>No extra I/O needed</a:t>
+            </a:r>
+            <a:endParaRPr lang="nl-NL" dirty="0"/>
+          </a:p>
+        </p:txBody>
+      </p:sp>
+      <p:sp>
+        <p:nvSpPr>
+          <p:cNvPr id="4" name="Footer Placeholder 3"/>
+          <p:cNvSpPr>
+            <a:spLocks noGrp="1"/>
+          </p:cNvSpPr>
+          <p:nvPr>
+            <p:ph type="ftr" sz="quarter" idx="10"/>
+          </p:nvPr>
+        </p:nvSpPr>
+        <p:spPr/>
+        <p:txBody>
+          <a:bodyPr/>
+          <a:lstStyle/>
+          <a:p>
+            <a:r>
+              <a:rPr lang="nl-NL" smtClean="0"/>
+              <a:t>Grid &amp; Cloud Computing</a:t>
+            </a:r>
+            <a:endParaRPr lang="nl-NL"/>
+          </a:p>
+        </p:txBody>
+      </p:sp>
+      <p:sp>
+        <p:nvSpPr>
+          <p:cNvPr id="5" name="Slide Number Placeholder 4"/>
+          <p:cNvSpPr>
+            <a:spLocks noGrp="1"/>
+          </p:cNvSpPr>
+          <p:nvPr>
+            <p:ph type="sldNum" sz="quarter" idx="11"/>
+          </p:nvPr>
+        </p:nvSpPr>
+        <p:spPr/>
+        <p:txBody>
+          <a:bodyPr/>
+          <a:lstStyle/>
+          <a:p>
+            <a:r>
+              <a:rPr lang="nl-NL" smtClean="0"/>
+              <a:t>PAGE </a:t>
+            </a:r>
+            <a:fld id="{EABF5C83-0A99-473C-B610-96803BDB6BB2}" type="slidenum">
+              <a:rPr lang="nl-NL" smtClean="0"/>
+              <a:pPr/>
+              <a:t>9</a:t>
+            </a:fld>
+            <a:endParaRPr lang="nl-NL"/>
+          </a:p>
+        </p:txBody>
+      </p:sp>
+      <p:sp>
+        <p:nvSpPr>
+          <p:cNvPr id="6" name="Date Placeholder 5"/>
+          <p:cNvSpPr>
+            <a:spLocks noGrp="1"/>
+          </p:cNvSpPr>
+          <p:nvPr>
+            <p:ph type="dt" sz="half" idx="12"/>
+          </p:nvPr>
+        </p:nvSpPr>
+        <p:spPr/>
+        <p:txBody>
+          <a:bodyPr/>
+          <a:lstStyle/>
+          <a:p>
+            <a:fld id="{294FE659-C695-4330-B737-C882170B1366}" type="datetime1">
+              <a:rPr lang="nl-NL" smtClean="0"/>
+              <a:t>24-9-2014</a:t>
+            </a:fld>
+            <a:endParaRPr lang="nl-NL"/>
+          </a:p>
+        </p:txBody>
+      </p:sp>
+      <p:sp>
+        <p:nvSpPr>
+          <p:cNvPr id="7" name="TextBox 6"/>
+          <p:cNvSpPr txBox="1"/>
+          <p:nvPr/>
+        </p:nvSpPr>
+        <p:spPr>
+          <a:xfrm>
+            <a:off x="533398" y="685800"/>
+            <a:ext cx="1043876" cy="523220"/>
+          </a:xfrm>
+          <a:prstGeom prst="rect">
+            <a:avLst/>
+          </a:prstGeom>
+          <a:noFill/>
+        </p:spPr>
+        <p:txBody>
+          <a:bodyPr wrap="none" rtlCol="0">
+            <a:spAutoFit/>
+          </a:bodyPr>
+          <a:lstStyle/>
+          <a:p>
+            <a:r>
+              <a:rPr lang="nl-NL" sz="2800" dirty="0" smtClean="0">
+                <a:solidFill>
+                  <a:schemeClr val="tx2"/>
+                </a:solidFill>
+                <a:latin typeface="+mj-lt"/>
+              </a:rPr>
+              <a:t>Store</a:t>
+            </a:r>
+            <a:endParaRPr lang="nl-NL" sz="2000" dirty="0">
+              <a:solidFill>
+                <a:schemeClr val="tx2"/>
+              </a:solidFill>
+              <a:latin typeface="+mj-lt"/>
+            </a:endParaRPr>
+          </a:p>
+        </p:txBody>
+      </p:sp>
+    </p:spTree>
+    <p:extLst>
+      <p:ext uri="{BB962C8B-B14F-4D97-AF65-F5344CB8AC3E}">
+        <p14:creationId xmlns:p14="http://schemas.microsoft.com/office/powerpoint/2010/main" val="3165501789"/>
+      </p:ext>
+    </p:extLst>
+  </p:cSld>
+  <p:clrMapOvr>
+    <a:masterClrMapping/>
+  </p:clrMapOvr>
+</p:sld>
+</file>
+
 <file path=ppt/slides/slide2.xml><?xml version="1.0" encoding="utf-8"?>
 <p:sld xmlns:a="http://schemas.openxmlformats.org/drawingml/2006/main" xmlns:r="http://schemas.openxmlformats.org/officeDocument/2006/relationships" xmlns:p="http://schemas.openxmlformats.org/presentationml/2006/main">
   <p:cSld>
@@ -11547,7 +12026,7 @@
           <a:p>
             <a:fld id="{294FE659-C695-4330-B737-C882170B1366}" type="datetime1">
               <a:rPr lang="nl-NL" smtClean="0"/>
-              <a:t>21-9-2014</a:t>
+              <a:t>24-9-2014</a:t>
             </a:fld>
             <a:endParaRPr lang="nl-NL"/>
           </a:p>
@@ -11674,7 +12153,7 @@
           <a:p>
             <a:fld id="{E7147D79-427E-4DFB-B2F6-CE7072FC429B}" type="datetime1">
               <a:rPr lang="nl-NL" smtClean="0"/>
-              <a:t>21-9-2014</a:t>
+              <a:t>24-9-2014</a:t>
             </a:fld>
             <a:endParaRPr lang="nl-NL"/>
           </a:p>
@@ -12031,7 +12510,7 @@
           <a:p>
             <a:fld id="{294FE659-C695-4330-B737-C882170B1366}" type="datetime1">
               <a:rPr lang="nl-NL" smtClean="0"/>
-              <a:t>21-9-2014</a:t>
+              <a:t>24-9-2014</a:t>
             </a:fld>
             <a:endParaRPr lang="nl-NL"/>
           </a:p>
@@ -12299,7 +12778,7 @@
           <a:p>
             <a:fld id="{294FE659-C695-4330-B737-C882170B1366}" type="datetime1">
               <a:rPr lang="nl-NL" smtClean="0"/>
-              <a:t>21-9-2014</a:t>
+              <a:t>24-9-2014</a:t>
             </a:fld>
             <a:endParaRPr lang="nl-NL"/>
           </a:p>
@@ -12582,7 +13061,7 @@
           <a:p>
             <a:fld id="{294FE659-C695-4330-B737-C882170B1366}" type="datetime1">
               <a:rPr lang="nl-NL" smtClean="0"/>
-              <a:t>21-9-2014</a:t>
+              <a:t>24-9-2014</a:t>
             </a:fld>
             <a:endParaRPr lang="nl-NL"/>
           </a:p>
@@ -12717,7 +13196,7 @@
           <a:p>
             <a:fld id="{294FE659-C695-4330-B737-C882170B1366}" type="datetime1">
               <a:rPr lang="nl-NL" smtClean="0"/>
-              <a:t>21-9-2014</a:t>
+              <a:t>24-9-2014</a:t>
             </a:fld>
             <a:endParaRPr lang="nl-NL"/>
           </a:p>
@@ -12829,16 +13308,21 @@
             <p:ph type="title"/>
           </p:nvPr>
         </p:nvSpPr>
-        <p:spPr/>
+        <p:spPr>
+          <a:xfrm>
+            <a:off x="611188" y="215900"/>
+            <a:ext cx="8024812" cy="590034"/>
+          </a:xfrm>
+        </p:spPr>
         <p:txBody>
           <a:bodyPr/>
           <a:lstStyle/>
           <a:p>
             <a:r>
-              <a:rPr lang="nl-NL" dirty="0" err="1" smtClean="0"/>
-              <a:t>Todo</a:t>
-            </a:r>
-            <a:endParaRPr lang="en-US" dirty="0"/>
+              <a:rPr lang="nl-NL" dirty="0" smtClean="0"/>
+              <a:t>Haystack architecture</a:t>
+            </a:r>
+            <a:endParaRPr lang="nl-NL" dirty="0"/>
           </a:p>
         </p:txBody>
       </p:sp>
@@ -12857,7 +13341,29 @@
           <a:bodyPr/>
           <a:lstStyle/>
           <a:p>
-            <a:endParaRPr lang="en-US"/>
+            <a:r>
+              <a:rPr lang="nl-NL" dirty="0" smtClean="0"/>
+              <a:t>Provides mapping from logical to physical</a:t>
+            </a:r>
+          </a:p>
+          <a:p>
+            <a:r>
+              <a:rPr lang="nl-NL" dirty="0" smtClean="0"/>
+              <a:t>Balances reads and writes</a:t>
+            </a:r>
+          </a:p>
+          <a:p>
+            <a:r>
+              <a:rPr lang="nl-NL" dirty="0" smtClean="0"/>
+              <a:t>Decide CDN or cache</a:t>
+            </a:r>
+          </a:p>
+          <a:p>
+            <a:r>
+              <a:rPr lang="nl-NL" dirty="0" smtClean="0"/>
+              <a:t>Manages read-only volumes</a:t>
+            </a:r>
+            <a:endParaRPr lang="nl-NL" dirty="0"/>
           </a:p>
         </p:txBody>
       </p:sp>
@@ -12929,16 +13435,291 @@
           <a:p>
             <a:fld id="{294FE659-C695-4330-B737-C882170B1366}" type="datetime1">
               <a:rPr lang="nl-NL" smtClean="0"/>
-              <a:t>21-9-2014</a:t>
+              <a:t>24-9-2014</a:t>
             </a:fld>
             <a:endParaRPr lang="nl-NL"/>
+          </a:p>
+        </p:txBody>
+      </p:sp>
+      <p:sp>
+        <p:nvSpPr>
+          <p:cNvPr id="7" name="TextBox 6"/>
+          <p:cNvSpPr txBox="1"/>
+          <p:nvPr/>
+        </p:nvSpPr>
+        <p:spPr>
+          <a:xfrm>
+            <a:off x="533398" y="685800"/>
+            <a:ext cx="1624163" cy="523220"/>
+          </a:xfrm>
+          <a:prstGeom prst="rect">
+            <a:avLst/>
+          </a:prstGeom>
+          <a:noFill/>
+        </p:spPr>
+        <p:txBody>
+          <a:bodyPr wrap="none" rtlCol="0">
+            <a:spAutoFit/>
+          </a:bodyPr>
+          <a:lstStyle/>
+          <a:p>
+            <a:r>
+              <a:rPr lang="nl-NL" sz="2800" dirty="0" smtClean="0">
+                <a:solidFill>
+                  <a:schemeClr val="tx2"/>
+                </a:solidFill>
+                <a:latin typeface="+mj-lt"/>
+              </a:rPr>
+              <a:t>Directory</a:t>
+            </a:r>
+            <a:endParaRPr lang="nl-NL" sz="2000" dirty="0">
+              <a:solidFill>
+                <a:schemeClr val="tx2"/>
+              </a:solidFill>
+              <a:latin typeface="+mj-lt"/>
+            </a:endParaRPr>
           </a:p>
         </p:txBody>
       </p:sp>
     </p:spTree>
     <p:extLst>
       <p:ext uri="{BB962C8B-B14F-4D97-AF65-F5344CB8AC3E}">
-        <p14:creationId xmlns:p14="http://schemas.microsoft.com/office/powerpoint/2010/main" val="2521388808"/>
+        <p14:creationId xmlns:p14="http://schemas.microsoft.com/office/powerpoint/2010/main" val="2067145650"/>
+      </p:ext>
+    </p:extLst>
+  </p:cSld>
+  <p:clrMapOvr>
+    <a:masterClrMapping/>
+  </p:clrMapOvr>
+</p:sld>
+</file>
+
+<file path=ppt/slides/slide9.xml><?xml version="1.0" encoding="utf-8"?>
+<p:sld xmlns:a="http://schemas.openxmlformats.org/drawingml/2006/main" xmlns:r="http://schemas.openxmlformats.org/officeDocument/2006/relationships" xmlns:p="http://schemas.openxmlformats.org/presentationml/2006/main">
+  <p:cSld>
+    <p:spTree>
+      <p:nvGrpSpPr>
+        <p:cNvPr id="1" name=""/>
+        <p:cNvGrpSpPr/>
+        <p:nvPr/>
+      </p:nvGrpSpPr>
+      <p:grpSpPr>
+        <a:xfrm>
+          <a:off x="0" y="0"/>
+          <a:ext cx="0" cy="0"/>
+          <a:chOff x="0" y="0"/>
+          <a:chExt cx="0" cy="0"/>
+        </a:xfrm>
+      </p:grpSpPr>
+      <p:sp>
+        <p:nvSpPr>
+          <p:cNvPr id="2" name="Title 1"/>
+          <p:cNvSpPr>
+            <a:spLocks noGrp="1"/>
+          </p:cNvSpPr>
+          <p:nvPr>
+            <p:ph type="title"/>
+          </p:nvPr>
+        </p:nvSpPr>
+        <p:spPr>
+          <a:xfrm>
+            <a:off x="611188" y="215900"/>
+            <a:ext cx="8024812" cy="590034"/>
+          </a:xfrm>
+        </p:spPr>
+        <p:txBody>
+          <a:bodyPr/>
+          <a:lstStyle/>
+          <a:p>
+            <a:r>
+              <a:rPr lang="nl-NL" dirty="0" smtClean="0"/>
+              <a:t>Haystack architecture</a:t>
+            </a:r>
+            <a:endParaRPr lang="nl-NL" dirty="0"/>
+          </a:p>
+        </p:txBody>
+      </p:sp>
+      <p:sp>
+        <p:nvSpPr>
+          <p:cNvPr id="3" name="Content Placeholder 2"/>
+          <p:cNvSpPr>
+            <a:spLocks noGrp="1"/>
+          </p:cNvSpPr>
+          <p:nvPr>
+            <p:ph idx="1"/>
+          </p:nvPr>
+        </p:nvSpPr>
+        <p:spPr/>
+        <p:txBody>
+          <a:bodyPr/>
+          <a:lstStyle/>
+          <a:p>
+            <a:r>
+              <a:rPr lang="nl-NL" dirty="0" smtClean="0"/>
+              <a:t>Receives HTTP requests</a:t>
+            </a:r>
+          </a:p>
+          <a:p>
+            <a:pPr lvl="1"/>
+            <a:r>
+              <a:rPr lang="nl-NL" dirty="0" smtClean="0"/>
+              <a:t>CDNs</a:t>
+            </a:r>
+          </a:p>
+          <a:p>
+            <a:pPr lvl="1"/>
+            <a:r>
+              <a:rPr lang="nl-NL" dirty="0" smtClean="0"/>
+              <a:t>Browsers</a:t>
+            </a:r>
+          </a:p>
+          <a:p>
+            <a:r>
+              <a:rPr lang="nl-NL" dirty="0" smtClean="0"/>
+              <a:t>Reads from store if not found</a:t>
+            </a:r>
+          </a:p>
+          <a:p>
+            <a:r>
+              <a:rPr lang="nl-NL" dirty="0" smtClean="0"/>
+              <a:t>Only caches when:</a:t>
+            </a:r>
+          </a:p>
+          <a:p>
+            <a:pPr lvl="1"/>
+            <a:r>
+              <a:rPr lang="nl-NL" dirty="0" smtClean="0"/>
+              <a:t>From user, not CDN</a:t>
+            </a:r>
+          </a:p>
+          <a:p>
+            <a:pPr lvl="1"/>
+            <a:r>
+              <a:rPr lang="nl-NL" dirty="0" smtClean="0"/>
+              <a:t>Fetched from write-enabled store</a:t>
+            </a:r>
+            <a:endParaRPr lang="nl-NL" dirty="0"/>
+          </a:p>
+        </p:txBody>
+      </p:sp>
+      <p:sp>
+        <p:nvSpPr>
+          <p:cNvPr id="4" name="Footer Placeholder 3"/>
+          <p:cNvSpPr>
+            <a:spLocks noGrp="1"/>
+          </p:cNvSpPr>
+          <p:nvPr>
+            <p:ph type="ftr" sz="quarter" idx="10"/>
+          </p:nvPr>
+        </p:nvSpPr>
+        <p:spPr/>
+        <p:txBody>
+          <a:bodyPr/>
+          <a:lstStyle/>
+          <a:p>
+            <a:r>
+              <a:rPr lang="nl-NL" smtClean="0"/>
+              <a:t>Grid &amp; Cloud Computing</a:t>
+            </a:r>
+            <a:endParaRPr lang="nl-NL"/>
+          </a:p>
+        </p:txBody>
+      </p:sp>
+      <p:sp>
+        <p:nvSpPr>
+          <p:cNvPr id="5" name="Slide Number Placeholder 4"/>
+          <p:cNvSpPr>
+            <a:spLocks noGrp="1"/>
+          </p:cNvSpPr>
+          <p:nvPr>
+            <p:ph type="sldNum" sz="quarter" idx="11"/>
+          </p:nvPr>
+        </p:nvSpPr>
+        <p:spPr/>
+        <p:txBody>
+          <a:bodyPr/>
+          <a:lstStyle/>
+          <a:p>
+            <a:r>
+              <a:rPr lang="nl-NL" smtClean="0"/>
+              <a:t>PAGE </a:t>
+            </a:r>
+            <a:fld id="{EABF5C83-0A99-473C-B610-96803BDB6BB2}" type="slidenum">
+              <a:rPr lang="nl-NL" smtClean="0"/>
+              <a:pPr/>
+              <a:t>8</a:t>
+            </a:fld>
+            <a:endParaRPr lang="nl-NL"/>
+          </a:p>
+        </p:txBody>
+      </p:sp>
+      <p:sp>
+        <p:nvSpPr>
+          <p:cNvPr id="6" name="Date Placeholder 5"/>
+          <p:cNvSpPr>
+            <a:spLocks noGrp="1"/>
+          </p:cNvSpPr>
+          <p:nvPr>
+            <p:ph type="dt" sz="half" idx="12"/>
+          </p:nvPr>
+        </p:nvSpPr>
+        <p:spPr/>
+        <p:txBody>
+          <a:bodyPr/>
+          <a:lstStyle/>
+          <a:p>
+            <a:fld id="{294FE659-C695-4330-B737-C882170B1366}" type="datetime1">
+              <a:rPr lang="nl-NL" smtClean="0"/>
+              <a:t>24-9-2014</a:t>
+            </a:fld>
+            <a:endParaRPr lang="nl-NL"/>
+          </a:p>
+        </p:txBody>
+      </p:sp>
+      <p:sp>
+        <p:nvSpPr>
+          <p:cNvPr id="7" name="TextBox 6"/>
+          <p:cNvSpPr txBox="1"/>
+          <p:nvPr/>
+        </p:nvSpPr>
+        <p:spPr>
+          <a:xfrm>
+            <a:off x="533398" y="685800"/>
+            <a:ext cx="1225015" cy="523220"/>
+          </a:xfrm>
+          <a:prstGeom prst="rect">
+            <a:avLst/>
+          </a:prstGeom>
+          <a:noFill/>
+        </p:spPr>
+        <p:txBody>
+          <a:bodyPr wrap="none" rtlCol="0">
+            <a:spAutoFit/>
+          </a:bodyPr>
+          <a:lstStyle/>
+          <a:p>
+            <a:r>
+              <a:rPr lang="nl-NL" sz="2800" dirty="0" smtClean="0">
+                <a:solidFill>
+                  <a:schemeClr val="tx2"/>
+                </a:solidFill>
+                <a:latin typeface="+mj-lt"/>
+              </a:rPr>
+              <a:t>Cache</a:t>
+            </a:r>
+            <a:endParaRPr lang="nl-NL" sz="2000" dirty="0">
+              <a:solidFill>
+                <a:schemeClr val="tx2"/>
+              </a:solidFill>
+              <a:latin typeface="+mj-lt"/>
+            </a:endParaRPr>
+          </a:p>
+        </p:txBody>
+      </p:sp>
+    </p:spTree>
+    <p:extLst>
+      <p:ext uri="{BB962C8B-B14F-4D97-AF65-F5344CB8AC3E}">
+        <p14:creationId xmlns:p14="http://schemas.microsoft.com/office/powerpoint/2010/main" val="3165501789"/>
       </p:ext>
     </p:extLst>
   </p:cSld>

</xml_diff>

<commit_message>
Add some notes, conclusion slide
</commit_message>
<xml_diff>
--- a/presentation/presentation.pptx
+++ b/presentation/presentation.pptx
@@ -7,7 +7,7 @@
     <p:sldMasterId id="2147483656" r:id="rId3"/>
   </p:sldMasterIdLst>
   <p:notesMasterIdLst>
-    <p:notesMasterId r:id="rId18"/>
+    <p:notesMasterId r:id="rId19"/>
   </p:notesMasterIdLst>
   <p:sldIdLst>
     <p:sldId id="256" r:id="rId4"/>
@@ -24,6 +24,7 @@
     <p:sldId id="267" r:id="rId15"/>
     <p:sldId id="268" r:id="rId16"/>
     <p:sldId id="269" r:id="rId17"/>
+    <p:sldId id="270" r:id="rId18"/>
   </p:sldIdLst>
   <p:sldSz cx="9144000" cy="6858000" type="screen4x3"/>
   <p:notesSz cx="6858000" cy="9144000"/>
@@ -1094,6 +1095,180 @@
 </p:notes>
 </file>
 
+<file path=ppt/notesSlides/notesSlide4.xml><?xml version="1.0" encoding="utf-8"?>
+<p:notes xmlns:a="http://schemas.openxmlformats.org/drawingml/2006/main" xmlns:r="http://schemas.openxmlformats.org/officeDocument/2006/relationships" xmlns:p="http://schemas.openxmlformats.org/presentationml/2006/main">
+  <p:cSld>
+    <p:spTree>
+      <p:nvGrpSpPr>
+        <p:cNvPr id="1" name=""/>
+        <p:cNvGrpSpPr/>
+        <p:nvPr/>
+      </p:nvGrpSpPr>
+      <p:grpSpPr>
+        <a:xfrm>
+          <a:off x="0" y="0"/>
+          <a:ext cx="0" cy="0"/>
+          <a:chOff x="0" y="0"/>
+          <a:chExt cx="0" cy="0"/>
+        </a:xfrm>
+      </p:grpSpPr>
+      <p:sp>
+        <p:nvSpPr>
+          <p:cNvPr id="2" name="Slide Image Placeholder 1"/>
+          <p:cNvSpPr>
+            <a:spLocks noGrp="1" noRot="1" noChangeAspect="1"/>
+          </p:cNvSpPr>
+          <p:nvPr>
+            <p:ph type="sldImg"/>
+          </p:nvPr>
+        </p:nvSpPr>
+        <p:spPr/>
+      </p:sp>
+      <p:sp>
+        <p:nvSpPr>
+          <p:cNvPr id="3" name="Notes Placeholder 2"/>
+          <p:cNvSpPr>
+            <a:spLocks noGrp="1"/>
+          </p:cNvSpPr>
+          <p:nvPr>
+            <p:ph type="body" idx="1"/>
+          </p:nvPr>
+        </p:nvSpPr>
+        <p:spPr/>
+        <p:txBody>
+          <a:bodyPr/>
+          <a:lstStyle/>
+          <a:p>
+            <a:r>
+              <a:rPr lang="nl-NL" dirty="0" smtClean="0"/>
+              <a:t>Justification for the cache policy</a:t>
+            </a:r>
+            <a:endParaRPr lang="nl-NL" dirty="0"/>
+          </a:p>
+        </p:txBody>
+      </p:sp>
+      <p:sp>
+        <p:nvSpPr>
+          <p:cNvPr id="4" name="Slide Number Placeholder 3"/>
+          <p:cNvSpPr>
+            <a:spLocks noGrp="1"/>
+          </p:cNvSpPr>
+          <p:nvPr>
+            <p:ph type="sldNum" sz="quarter" idx="10"/>
+          </p:nvPr>
+        </p:nvSpPr>
+        <p:spPr/>
+        <p:txBody>
+          <a:bodyPr/>
+          <a:lstStyle/>
+          <a:p>
+            <a:fld id="{8106FA6E-CA28-4ADD-97EA-D8B210CE5A1D}" type="slidenum">
+              <a:rPr lang="nl-NL" smtClean="0"/>
+              <a:pPr/>
+              <a:t>11</a:t>
+            </a:fld>
+            <a:endParaRPr lang="nl-NL"/>
+          </a:p>
+        </p:txBody>
+      </p:sp>
+    </p:spTree>
+    <p:extLst>
+      <p:ext uri="{BB962C8B-B14F-4D97-AF65-F5344CB8AC3E}">
+        <p14:creationId xmlns:p14="http://schemas.microsoft.com/office/powerpoint/2010/main" val="3305135313"/>
+      </p:ext>
+    </p:extLst>
+  </p:cSld>
+  <p:clrMapOvr>
+    <a:masterClrMapping/>
+  </p:clrMapOvr>
+</p:notes>
+</file>
+
+<file path=ppt/notesSlides/notesSlide5.xml><?xml version="1.0" encoding="utf-8"?>
+<p:notes xmlns:a="http://schemas.openxmlformats.org/drawingml/2006/main" xmlns:r="http://schemas.openxmlformats.org/officeDocument/2006/relationships" xmlns:p="http://schemas.openxmlformats.org/presentationml/2006/main">
+  <p:cSld>
+    <p:spTree>
+      <p:nvGrpSpPr>
+        <p:cNvPr id="1" name=""/>
+        <p:cNvGrpSpPr/>
+        <p:nvPr/>
+      </p:nvGrpSpPr>
+      <p:grpSpPr>
+        <a:xfrm>
+          <a:off x="0" y="0"/>
+          <a:ext cx="0" cy="0"/>
+          <a:chOff x="0" y="0"/>
+          <a:chExt cx="0" cy="0"/>
+        </a:xfrm>
+      </p:grpSpPr>
+      <p:sp>
+        <p:nvSpPr>
+          <p:cNvPr id="2" name="Slide Image Placeholder 1"/>
+          <p:cNvSpPr>
+            <a:spLocks noGrp="1" noRot="1" noChangeAspect="1"/>
+          </p:cNvSpPr>
+          <p:nvPr>
+            <p:ph type="sldImg"/>
+          </p:nvPr>
+        </p:nvSpPr>
+        <p:spPr/>
+      </p:sp>
+      <p:sp>
+        <p:nvSpPr>
+          <p:cNvPr id="3" name="Notes Placeholder 2"/>
+          <p:cNvSpPr>
+            <a:spLocks noGrp="1"/>
+          </p:cNvSpPr>
+          <p:nvPr>
+            <p:ph type="body" idx="1"/>
+          </p:nvPr>
+        </p:nvSpPr>
+        <p:spPr/>
+        <p:txBody>
+          <a:bodyPr/>
+          <a:lstStyle/>
+          <a:p>
+            <a:endParaRPr lang="nl-NL" dirty="0"/>
+          </a:p>
+        </p:txBody>
+      </p:sp>
+      <p:sp>
+        <p:nvSpPr>
+          <p:cNvPr id="4" name="Slide Number Placeholder 3"/>
+          <p:cNvSpPr>
+            <a:spLocks noGrp="1"/>
+          </p:cNvSpPr>
+          <p:nvPr>
+            <p:ph type="sldNum" sz="quarter" idx="10"/>
+          </p:nvPr>
+        </p:nvSpPr>
+        <p:spPr/>
+        <p:txBody>
+          <a:bodyPr/>
+          <a:lstStyle/>
+          <a:p>
+            <a:fld id="{8106FA6E-CA28-4ADD-97EA-D8B210CE5A1D}" type="slidenum">
+              <a:rPr lang="nl-NL" smtClean="0"/>
+              <a:pPr/>
+              <a:t>14</a:t>
+            </a:fld>
+            <a:endParaRPr lang="nl-NL"/>
+          </a:p>
+        </p:txBody>
+      </p:sp>
+    </p:spTree>
+    <p:extLst>
+      <p:ext uri="{BB962C8B-B14F-4D97-AF65-F5344CB8AC3E}">
+        <p14:creationId xmlns:p14="http://schemas.microsoft.com/office/powerpoint/2010/main" val="3237289643"/>
+      </p:ext>
+    </p:extLst>
+  </p:cSld>
+  <p:clrMapOvr>
+    <a:masterClrMapping/>
+  </p:clrMapOvr>
+</p:notes>
+</file>
+
 <file path=ppt/slideLayouts/slideLayout1.xml><?xml version="1.0" encoding="utf-8"?>
 <p:sldLayout xmlns:a="http://schemas.openxmlformats.org/drawingml/2006/main" xmlns:r="http://schemas.openxmlformats.org/officeDocument/2006/relationships" xmlns:p="http://schemas.openxmlformats.org/presentationml/2006/main" showMasterSp="0" type="title" preserve="1">
   <p:cSld name="Title Slide">
@@ -1375,7 +1550,7 @@
           <a:p>
             <a:fld id="{1FA17AF5-FBB5-4916-8910-0F5324AF15F2}" type="datetime1">
               <a:rPr lang="nl-NL" smtClean="0"/>
-              <a:t>24-9-2014</a:t>
+              <a:t>25-9-2014</a:t>
             </a:fld>
             <a:endParaRPr lang="nl-NL"/>
           </a:p>
@@ -1576,7 +1751,7 @@
           <a:p>
             <a:fld id="{CCA5352A-0CC6-4438-BD9F-8704C8925C42}" type="datetime1">
               <a:rPr lang="nl-NL" smtClean="0"/>
-              <a:t>24-9-2014</a:t>
+              <a:t>25-9-2014</a:t>
             </a:fld>
             <a:endParaRPr lang="nl-NL"/>
           </a:p>
@@ -1944,7 +2119,7 @@
           <a:p>
             <a:fld id="{EB233FDD-2AC2-4E17-B268-9C194B3D7FE7}" type="datetime1">
               <a:rPr lang="nl-NL" smtClean="0"/>
-              <a:t>24-9-2014</a:t>
+              <a:t>25-9-2014</a:t>
             </a:fld>
             <a:endParaRPr lang="nl-NL"/>
           </a:p>
@@ -2157,7 +2332,7 @@
           <a:p>
             <a:fld id="{B7A7F543-CD81-4195-A8EA-FAAEB8BF2ACF}" type="datetime1">
               <a:rPr lang="nl-NL" smtClean="0"/>
-              <a:t>24-9-2014</a:t>
+              <a:t>25-9-2014</a:t>
             </a:fld>
             <a:endParaRPr lang="nl-NL"/>
           </a:p>
@@ -2466,7 +2641,7 @@
           <a:p>
             <a:fld id="{881C6A17-9D20-411C-BF2A-6DE941E6C5A0}" type="datetime1">
               <a:rPr lang="nl-NL" smtClean="0"/>
-              <a:t>24-9-2014</a:t>
+              <a:t>25-9-2014</a:t>
             </a:fld>
             <a:endParaRPr lang="nl-NL"/>
           </a:p>
@@ -2914,7 +3089,7 @@
           <a:p>
             <a:fld id="{78C69642-B6AA-4ED7-8D60-DB675A092ABD}" type="datetime1">
               <a:rPr lang="nl-NL" smtClean="0"/>
-              <a:t>24-9-2014</a:t>
+              <a:t>25-9-2014</a:t>
             </a:fld>
             <a:endParaRPr lang="nl-NL"/>
           </a:p>
@@ -3053,7 +3228,7 @@
           <a:p>
             <a:fld id="{2F548E62-B384-4D17-A8E3-B4EC20800DEE}" type="datetime1">
               <a:rPr lang="nl-NL" smtClean="0"/>
-              <a:t>24-9-2014</a:t>
+              <a:t>25-9-2014</a:t>
             </a:fld>
             <a:endParaRPr lang="nl-NL"/>
           </a:p>
@@ -3169,7 +3344,7 @@
           <a:p>
             <a:fld id="{1D65376C-5DFC-49F4-8DFB-E1F46C832719}" type="datetime1">
               <a:rPr lang="nl-NL" smtClean="0"/>
-              <a:t>24-9-2014</a:t>
+              <a:t>25-9-2014</a:t>
             </a:fld>
             <a:endParaRPr lang="nl-NL"/>
           </a:p>
@@ -3467,7 +3642,7 @@
           <a:p>
             <a:fld id="{13B4B9A4-F0E6-47E7-8CF1-BD6DE7407917}" type="datetime1">
               <a:rPr lang="nl-NL" smtClean="0"/>
-              <a:t>24-9-2014</a:t>
+              <a:t>25-9-2014</a:t>
             </a:fld>
             <a:endParaRPr lang="nl-NL"/>
           </a:p>
@@ -3658,7 +3833,7 @@
           <a:p>
             <a:fld id="{294FE659-C695-4330-B737-C882170B1366}" type="datetime1">
               <a:rPr lang="nl-NL" smtClean="0"/>
-              <a:t>24-9-2014</a:t>
+              <a:t>25-9-2014</a:t>
             </a:fld>
             <a:endParaRPr lang="nl-NL"/>
           </a:p>
@@ -3932,7 +4107,7 @@
           <a:p>
             <a:fld id="{F75B3122-9457-4CF7-8F75-8AA0C4D0E80D}" type="datetime1">
               <a:rPr lang="nl-NL" smtClean="0"/>
-              <a:t>24-9-2014</a:t>
+              <a:t>25-9-2014</a:t>
             </a:fld>
             <a:endParaRPr lang="nl-NL"/>
           </a:p>
@@ -4123,7 +4298,7 @@
           <a:p>
             <a:fld id="{FDBDA0CD-BD68-47B1-AEFF-2A74DBD9F203}" type="datetime1">
               <a:rPr lang="nl-NL" smtClean="0"/>
-              <a:t>24-9-2014</a:t>
+              <a:t>25-9-2014</a:t>
             </a:fld>
             <a:endParaRPr lang="nl-NL"/>
           </a:p>
@@ -4324,7 +4499,7 @@
           <a:p>
             <a:fld id="{34581CC6-2DEA-411C-BF5C-82FAAD850880}" type="datetime1">
               <a:rPr lang="nl-NL" smtClean="0"/>
-              <a:t>24-9-2014</a:t>
+              <a:t>25-9-2014</a:t>
             </a:fld>
             <a:endParaRPr lang="nl-NL"/>
           </a:p>
@@ -4622,7 +4797,7 @@
           <a:p>
             <a:fld id="{E52B3786-FC07-41A1-89C4-63E8CC105088}" type="datetime1">
               <a:rPr lang="nl-NL" smtClean="0"/>
-              <a:t>24-9-2014</a:t>
+              <a:t>25-9-2014</a:t>
             </a:fld>
             <a:endParaRPr lang="nl-NL"/>
           </a:p>
@@ -4835,7 +5010,7 @@
           <a:p>
             <a:fld id="{417AD321-A2E5-44EA-A77D-689667D84A3D}" type="datetime1">
               <a:rPr lang="nl-NL" smtClean="0"/>
-              <a:t>24-9-2014</a:t>
+              <a:t>25-9-2014</a:t>
             </a:fld>
             <a:endParaRPr lang="nl-NL"/>
           </a:p>
@@ -5144,7 +5319,7 @@
           <a:p>
             <a:fld id="{1CF528E7-C3DB-478C-9E53-66EE4E44624B}" type="datetime1">
               <a:rPr lang="nl-NL" smtClean="0"/>
-              <a:t>24-9-2014</a:t>
+              <a:t>25-9-2014</a:t>
             </a:fld>
             <a:endParaRPr lang="nl-NL"/>
           </a:p>
@@ -5592,7 +5767,7 @@
           <a:p>
             <a:fld id="{D1DF25AE-F6BE-4CFA-9353-36F273A72864}" type="datetime1">
               <a:rPr lang="nl-NL" smtClean="0"/>
-              <a:t>24-9-2014</a:t>
+              <a:t>25-9-2014</a:t>
             </a:fld>
             <a:endParaRPr lang="nl-NL"/>
           </a:p>
@@ -5731,7 +5906,7 @@
           <a:p>
             <a:fld id="{89A4AB83-6B5D-4630-BE5A-6C53A88B0EA2}" type="datetime1">
               <a:rPr lang="nl-NL" smtClean="0"/>
-              <a:t>24-9-2014</a:t>
+              <a:t>25-9-2014</a:t>
             </a:fld>
             <a:endParaRPr lang="nl-NL"/>
           </a:p>
@@ -5847,7 +6022,7 @@
           <a:p>
             <a:fld id="{5386EC31-8267-4B8E-9F09-043A589D57B0}" type="datetime1">
               <a:rPr lang="nl-NL" smtClean="0"/>
-              <a:t>24-9-2014</a:t>
+              <a:t>25-9-2014</a:t>
             </a:fld>
             <a:endParaRPr lang="nl-NL"/>
           </a:p>
@@ -6060,7 +6235,7 @@
           <a:p>
             <a:fld id="{84B7A284-E8FA-410F-8647-3F020546BF2F}" type="datetime1">
               <a:rPr lang="nl-NL" smtClean="0"/>
-              <a:t>24-9-2014</a:t>
+              <a:t>25-9-2014</a:t>
             </a:fld>
             <a:endParaRPr lang="nl-NL"/>
           </a:p>
@@ -6358,7 +6533,7 @@
           <a:p>
             <a:fld id="{143011F3-9191-4AE9-990E-5106A0D38BAA}" type="datetime1">
               <a:rPr lang="nl-NL" smtClean="0"/>
-              <a:t>24-9-2014</a:t>
+              <a:t>25-9-2014</a:t>
             </a:fld>
             <a:endParaRPr lang="nl-NL"/>
           </a:p>
@@ -6632,7 +6807,7 @@
           <a:p>
             <a:fld id="{5DC4A893-DA4A-4972-B9DB-504BDFCD152F}" type="datetime1">
               <a:rPr lang="nl-NL" smtClean="0"/>
-              <a:t>24-9-2014</a:t>
+              <a:t>25-9-2014</a:t>
             </a:fld>
             <a:endParaRPr lang="nl-NL"/>
           </a:p>
@@ -6823,7 +6998,7 @@
           <a:p>
             <a:fld id="{81FB8097-25CB-4800-8518-9A96B11CF4CA}" type="datetime1">
               <a:rPr lang="nl-NL" smtClean="0"/>
-              <a:t>24-9-2014</a:t>
+              <a:t>25-9-2014</a:t>
             </a:fld>
             <a:endParaRPr lang="nl-NL"/>
           </a:p>
@@ -7024,7 +7199,7 @@
           <a:p>
             <a:fld id="{D36F1D4B-27ED-4673-A0F3-EB7D4CBBDBAE}" type="datetime1">
               <a:rPr lang="nl-NL" smtClean="0"/>
-              <a:t>24-9-2014</a:t>
+              <a:t>25-9-2014</a:t>
             </a:fld>
             <a:endParaRPr lang="nl-NL"/>
           </a:p>
@@ -7333,7 +7508,7 @@
           <a:p>
             <a:fld id="{92118B19-F915-4362-8044-8D14F740C9C4}" type="datetime1">
               <a:rPr lang="nl-NL" smtClean="0"/>
-              <a:t>24-9-2014</a:t>
+              <a:t>25-9-2014</a:t>
             </a:fld>
             <a:endParaRPr lang="nl-NL"/>
           </a:p>
@@ -7781,7 +7956,7 @@
           <a:p>
             <a:fld id="{81FE54C6-A890-47F1-BFAC-F11C102B5C7A}" type="datetime1">
               <a:rPr lang="nl-NL" smtClean="0"/>
-              <a:t>24-9-2014</a:t>
+              <a:t>25-9-2014</a:t>
             </a:fld>
             <a:endParaRPr lang="nl-NL"/>
           </a:p>
@@ -7920,7 +8095,7 @@
           <a:p>
             <a:fld id="{FE4182E6-C31C-4527-B69D-712019065F4C}" type="datetime1">
               <a:rPr lang="nl-NL" smtClean="0"/>
-              <a:t>24-9-2014</a:t>
+              <a:t>25-9-2014</a:t>
             </a:fld>
             <a:endParaRPr lang="nl-NL"/>
           </a:p>
@@ -8036,7 +8211,7 @@
           <a:p>
             <a:fld id="{136414F8-8B26-47E6-B4FF-C17F389603D6}" type="datetime1">
               <a:rPr lang="nl-NL" smtClean="0"/>
-              <a:t>24-9-2014</a:t>
+              <a:t>25-9-2014</a:t>
             </a:fld>
             <a:endParaRPr lang="nl-NL"/>
           </a:p>
@@ -8334,7 +8509,7 @@
           <a:p>
             <a:fld id="{B834BFC9-1A10-41EB-B79A-AA7A9638BAEB}" type="datetime1">
               <a:rPr lang="nl-NL" smtClean="0"/>
-              <a:t>24-9-2014</a:t>
+              <a:t>25-9-2014</a:t>
             </a:fld>
             <a:endParaRPr lang="nl-NL"/>
           </a:p>
@@ -8612,7 +8787,7 @@
           <a:p>
             <a:fld id="{17292D92-150B-4046-AF94-224E9E2438F2}" type="datetime1">
               <a:rPr lang="nl-NL" smtClean="0"/>
-              <a:t>24-9-2014</a:t>
+              <a:t>25-9-2014</a:t>
             </a:fld>
             <a:endParaRPr lang="nl-NL"/>
           </a:p>
@@ -9071,7 +9246,7 @@
           <a:p>
             <a:fld id="{0ED15440-D4DF-477C-8731-94CD6D3F5877}" type="datetime1">
               <a:rPr lang="nl-NL" smtClean="0"/>
-              <a:t>24-9-2014</a:t>
+              <a:t>25-9-2014</a:t>
             </a:fld>
             <a:endParaRPr lang="nl-NL"/>
           </a:p>
@@ -10033,7 +10208,7 @@
           <a:p>
             <a:fld id="{238076FC-E76B-4057-9795-CFC6D2173E8B}" type="datetime1">
               <a:rPr lang="nl-NL" smtClean="0"/>
-              <a:t>24-9-2014</a:t>
+              <a:t>25-9-2014</a:t>
             </a:fld>
             <a:endParaRPr lang="nl-NL"/>
           </a:p>
@@ -10994,7 +11169,7 @@
           <a:p>
             <a:fld id="{412F90C6-2F83-4F4F-A3F0-58B36B07887E}" type="datetime1">
               <a:rPr lang="nl-NL" smtClean="0"/>
-              <a:t>24-9-2014</a:t>
+              <a:t>25-9-2014</a:t>
             </a:fld>
             <a:endParaRPr lang="nl-NL"/>
           </a:p>
@@ -11783,7 +11958,7 @@
           <a:p>
             <a:fld id="{294FE659-C695-4330-B737-C882170B1366}" type="datetime1">
               <a:rPr lang="nl-NL" smtClean="0"/>
-              <a:t>24-9-2014</a:t>
+              <a:t>25-9-2014</a:t>
             </a:fld>
             <a:endParaRPr lang="nl-NL"/>
           </a:p>
@@ -11969,7 +12144,7 @@
           <a:p>
             <a:fld id="{294FE659-C695-4330-B737-C882170B1366}" type="datetime1">
               <a:rPr lang="nl-NL" smtClean="0"/>
-              <a:t>24-9-2014</a:t>
+              <a:t>25-9-2014</a:t>
             </a:fld>
             <a:endParaRPr lang="nl-NL"/>
           </a:p>
@@ -12014,7 +12189,7 @@
           <p:nvPr/>
         </p:nvPicPr>
         <p:blipFill>
-          <a:blip r:embed="rId2">
+          <a:blip r:embed="rId3">
             <a:extLst>
               <a:ext uri="{28A0092B-C50C-407E-A947-70E740481C1C}">
                 <a14:useLocalDpi xmlns:a14="http://schemas.microsoft.com/office/drawing/2010/main" val="0"/>
@@ -12303,7 +12478,7 @@
           <a:p>
             <a:fld id="{294FE659-C695-4330-B737-C882170B1366}" type="datetime1">
               <a:rPr lang="nl-NL" smtClean="0"/>
-              <a:t>24-9-2014</a:t>
+              <a:t>25-9-2014</a:t>
             </a:fld>
             <a:endParaRPr lang="nl-NL"/>
           </a:p>
@@ -12531,7 +12706,7 @@
           <a:p>
             <a:fld id="{294FE659-C695-4330-B737-C882170B1366}" type="datetime1">
               <a:rPr lang="nl-NL" smtClean="0"/>
-              <a:t>24-9-2014</a:t>
+              <a:t>25-9-2014</a:t>
             </a:fld>
             <a:endParaRPr lang="nl-NL"/>
           </a:p>
@@ -12674,16 +12849,12 @@
           <a:lstStyle/>
           <a:p>
             <a:r>
-              <a:rPr lang="nl-NL" dirty="0" err="1" smtClean="0"/>
-              <a:t>Cach</a:t>
-            </a:r>
-            <a:r>
               <a:rPr lang="nl-NL" dirty="0" smtClean="0"/>
-              <a:t> hit </a:t>
-            </a:r>
-            <a:r>
-              <a:rPr lang="nl-NL" dirty="0" err="1" smtClean="0"/>
-              <a:t>rate</a:t>
+              <a:t>Cache </a:t>
+            </a:r>
+            <a:r>
+              <a:rPr lang="nl-NL" dirty="0" smtClean="0"/>
+              <a:t>hit rate</a:t>
             </a:r>
             <a:endParaRPr lang="en-US" dirty="0"/>
           </a:p>
@@ -12757,7 +12928,7 @@
           <a:p>
             <a:fld id="{294FE659-C695-4330-B737-C882170B1366}" type="datetime1">
               <a:rPr lang="nl-NL" smtClean="0"/>
-              <a:t>24-9-2014</a:t>
+              <a:t>25-9-2014</a:t>
             </a:fld>
             <a:endParaRPr lang="nl-NL"/>
           </a:p>
@@ -12767,6 +12938,168 @@
     <p:extLst>
       <p:ext uri="{BB962C8B-B14F-4D97-AF65-F5344CB8AC3E}">
         <p14:creationId xmlns:p14="http://schemas.microsoft.com/office/powerpoint/2010/main" val="3429856144"/>
+      </p:ext>
+    </p:extLst>
+  </p:cSld>
+  <p:clrMapOvr>
+    <a:masterClrMapping/>
+  </p:clrMapOvr>
+</p:sld>
+</file>
+
+<file path=ppt/slides/slide15.xml><?xml version="1.0" encoding="utf-8"?>
+<p:sld xmlns:a="http://schemas.openxmlformats.org/drawingml/2006/main" xmlns:r="http://schemas.openxmlformats.org/officeDocument/2006/relationships" xmlns:p="http://schemas.openxmlformats.org/presentationml/2006/main">
+  <p:cSld>
+    <p:spTree>
+      <p:nvGrpSpPr>
+        <p:cNvPr id="1" name=""/>
+        <p:cNvGrpSpPr/>
+        <p:nvPr/>
+      </p:nvGrpSpPr>
+      <p:grpSpPr>
+        <a:xfrm>
+          <a:off x="0" y="0"/>
+          <a:ext cx="0" cy="0"/>
+          <a:chOff x="0" y="0"/>
+          <a:chExt cx="0" cy="0"/>
+        </a:xfrm>
+      </p:grpSpPr>
+      <p:sp>
+        <p:nvSpPr>
+          <p:cNvPr id="2" name="Title 1"/>
+          <p:cNvSpPr>
+            <a:spLocks noGrp="1"/>
+          </p:cNvSpPr>
+          <p:nvPr>
+            <p:ph type="title"/>
+          </p:nvPr>
+        </p:nvSpPr>
+        <p:spPr/>
+        <p:txBody>
+          <a:bodyPr/>
+          <a:lstStyle/>
+          <a:p>
+            <a:r>
+              <a:rPr lang="nl-NL" dirty="0" smtClean="0"/>
+              <a:t>Conclusion</a:t>
+            </a:r>
+            <a:endParaRPr lang="nl-NL" dirty="0"/>
+          </a:p>
+        </p:txBody>
+      </p:sp>
+      <p:sp>
+        <p:nvSpPr>
+          <p:cNvPr id="3" name="Content Placeholder 2"/>
+          <p:cNvSpPr>
+            <a:spLocks noGrp="1"/>
+          </p:cNvSpPr>
+          <p:nvPr>
+            <p:ph idx="1"/>
+          </p:nvPr>
+        </p:nvSpPr>
+        <p:spPr/>
+        <p:txBody>
+          <a:bodyPr/>
+          <a:lstStyle/>
+          <a:p>
+            <a:r>
+              <a:rPr lang="nl-NL" dirty="0" smtClean="0"/>
+              <a:t>New system greatly improves on old</a:t>
+            </a:r>
+          </a:p>
+          <a:p>
+            <a:r>
+              <a:rPr lang="nl-NL" dirty="0" smtClean="0"/>
+              <a:t>More efficient use of CDNs</a:t>
+            </a:r>
+          </a:p>
+          <a:p>
+            <a:r>
+              <a:rPr lang="nl-NL" dirty="0" smtClean="0"/>
+              <a:t>Battle-tested</a:t>
+            </a:r>
+            <a:endParaRPr lang="nl-NL" dirty="0"/>
+          </a:p>
+        </p:txBody>
+      </p:sp>
+      <p:sp>
+        <p:nvSpPr>
+          <p:cNvPr id="4" name="Footer Placeholder 3"/>
+          <p:cNvSpPr>
+            <a:spLocks noGrp="1"/>
+          </p:cNvSpPr>
+          <p:nvPr>
+            <p:ph type="ftr" sz="quarter" idx="10"/>
+          </p:nvPr>
+        </p:nvSpPr>
+        <p:spPr/>
+        <p:txBody>
+          <a:bodyPr/>
+          <a:lstStyle/>
+          <a:p>
+            <a:r>
+              <a:rPr lang="nl-NL" smtClean="0"/>
+              <a:t>Grid &amp; Cloud Computing</a:t>
+            </a:r>
+            <a:endParaRPr lang="nl-NL"/>
+          </a:p>
+        </p:txBody>
+      </p:sp>
+      <p:sp>
+        <p:nvSpPr>
+          <p:cNvPr id="5" name="Slide Number Placeholder 4"/>
+          <p:cNvSpPr>
+            <a:spLocks noGrp="1"/>
+          </p:cNvSpPr>
+          <p:nvPr>
+            <p:ph type="sldNum" sz="quarter" idx="11"/>
+          </p:nvPr>
+        </p:nvSpPr>
+        <p:spPr/>
+        <p:txBody>
+          <a:bodyPr/>
+          <a:lstStyle/>
+          <a:p>
+            <a:r>
+              <a:rPr lang="nl-NL" smtClean="0"/>
+              <a:t>PAGE </a:t>
+            </a:r>
+            <a:fld id="{EABF5C83-0A99-473C-B610-96803BDB6BB2}" type="slidenum">
+              <a:rPr lang="nl-NL" smtClean="0"/>
+              <a:pPr/>
+              <a:t>14</a:t>
+            </a:fld>
+            <a:endParaRPr lang="nl-NL"/>
+          </a:p>
+        </p:txBody>
+      </p:sp>
+      <p:sp>
+        <p:nvSpPr>
+          <p:cNvPr id="6" name="Date Placeholder 5"/>
+          <p:cNvSpPr>
+            <a:spLocks noGrp="1"/>
+          </p:cNvSpPr>
+          <p:nvPr>
+            <p:ph type="dt" sz="half" idx="12"/>
+          </p:nvPr>
+        </p:nvSpPr>
+        <p:spPr/>
+        <p:txBody>
+          <a:bodyPr/>
+          <a:lstStyle/>
+          <a:p>
+            <a:fld id="{294FE659-C695-4330-B737-C882170B1366}" type="datetime1">
+              <a:rPr lang="nl-NL" smtClean="0"/>
+              <a:t>25-9-2014</a:t>
+            </a:fld>
+            <a:endParaRPr lang="nl-NL"/>
+          </a:p>
+        </p:txBody>
+      </p:sp>
+    </p:spTree>
+    <p:extLst>
+      <p:ext uri="{BB962C8B-B14F-4D97-AF65-F5344CB8AC3E}">
+        <p14:creationId xmlns:p14="http://schemas.microsoft.com/office/powerpoint/2010/main" val="1720366481"/>
       </p:ext>
     </p:extLst>
   </p:cSld>
@@ -12964,7 +13297,7 @@
           <a:p>
             <a:fld id="{294FE659-C695-4330-B737-C882170B1366}" type="datetime1">
               <a:rPr lang="nl-NL" smtClean="0"/>
-              <a:t>24-9-2014</a:t>
+              <a:t>25-9-2014</a:t>
             </a:fld>
             <a:endParaRPr lang="nl-NL"/>
           </a:p>
@@ -13091,7 +13424,7 @@
           <a:p>
             <a:fld id="{E7147D79-427E-4DFB-B2F6-CE7072FC429B}" type="datetime1">
               <a:rPr lang="nl-NL" smtClean="0"/>
-              <a:t>24-9-2014</a:t>
+              <a:t>25-9-2014</a:t>
             </a:fld>
             <a:endParaRPr lang="nl-NL"/>
           </a:p>
@@ -13448,7 +13781,7 @@
           <a:p>
             <a:fld id="{294FE659-C695-4330-B737-C882170B1366}" type="datetime1">
               <a:rPr lang="nl-NL" smtClean="0"/>
-              <a:t>24-9-2014</a:t>
+              <a:t>25-9-2014</a:t>
             </a:fld>
             <a:endParaRPr lang="nl-NL"/>
           </a:p>
@@ -13716,7 +14049,7 @@
           <a:p>
             <a:fld id="{294FE659-C695-4330-B737-C882170B1366}" type="datetime1">
               <a:rPr lang="nl-NL" smtClean="0"/>
-              <a:t>24-9-2014</a:t>
+              <a:t>25-9-2014</a:t>
             </a:fld>
             <a:endParaRPr lang="nl-NL"/>
           </a:p>
@@ -13999,7 +14332,7 @@
           <a:p>
             <a:fld id="{294FE659-C695-4330-B737-C882170B1366}" type="datetime1">
               <a:rPr lang="nl-NL" smtClean="0"/>
-              <a:t>24-9-2014</a:t>
+              <a:t>25-9-2014</a:t>
             </a:fld>
             <a:endParaRPr lang="nl-NL"/>
           </a:p>
@@ -14134,7 +14467,7 @@
           <a:p>
             <a:fld id="{294FE659-C695-4330-B737-C882170B1366}" type="datetime1">
               <a:rPr lang="nl-NL" smtClean="0"/>
-              <a:t>24-9-2014</a:t>
+              <a:t>25-9-2014</a:t>
             </a:fld>
             <a:endParaRPr lang="nl-NL"/>
           </a:p>
@@ -14373,7 +14706,7 @@
           <a:p>
             <a:fld id="{294FE659-C695-4330-B737-C882170B1366}" type="datetime1">
               <a:rPr lang="nl-NL" smtClean="0"/>
-              <a:t>24-9-2014</a:t>
+              <a:t>25-9-2014</a:t>
             </a:fld>
             <a:endParaRPr lang="nl-NL"/>
           </a:p>
@@ -14608,7 +14941,7 @@
           <a:p>
             <a:fld id="{294FE659-C695-4330-B737-C882170B1366}" type="datetime1">
               <a:rPr lang="nl-NL" smtClean="0"/>
-              <a:t>24-9-2014</a:t>
+              <a:t>25-9-2014</a:t>
             </a:fld>
             <a:endParaRPr lang="nl-NL"/>
           </a:p>

</xml_diff>